<commit_message>
i have added objective pages in ppt
</commit_message>
<xml_diff>
--- a/Presentation/FINAL PPT FOR PRASENTATION.pptx
+++ b/Presentation/FINAL PPT FOR PRASENTATION.pptx
@@ -7,14 +7,15 @@
   <p:sldIdLst>
     <p:sldId id="258" r:id="rId2"/>
     <p:sldId id="260" r:id="rId3"/>
-    <p:sldId id="261" r:id="rId4"/>
-    <p:sldId id="262" r:id="rId5"/>
-    <p:sldId id="263" r:id="rId6"/>
-    <p:sldId id="264" r:id="rId7"/>
-    <p:sldId id="265" r:id="rId8"/>
-    <p:sldId id="266" r:id="rId9"/>
-    <p:sldId id="267" r:id="rId10"/>
-    <p:sldId id="256" r:id="rId11"/>
+    <p:sldId id="269" r:id="rId4"/>
+    <p:sldId id="261" r:id="rId5"/>
+    <p:sldId id="262" r:id="rId6"/>
+    <p:sldId id="263" r:id="rId7"/>
+    <p:sldId id="264" r:id="rId8"/>
+    <p:sldId id="265" r:id="rId9"/>
+    <p:sldId id="266" r:id="rId10"/>
+    <p:sldId id="267" r:id="rId11"/>
+    <p:sldId id="256" r:id="rId12"/>
   </p:sldIdLst>
   <p:sldSz cx="12192000" cy="6858000"/>
   <p:notesSz cx="6858000" cy="9144000"/>
@@ -5149,7 +5150,7 @@
           <a:p>
             <a:fld id="{3F53D0AD-E1A3-4664-BA40-9EEE7E01C0C5}" type="datetimeFigureOut">
               <a:rPr lang="en-IN" smtClean="0"/>
-              <a:t>02-01-2021</a:t>
+              <a:t>03-01-2021</a:t>
             </a:fld>
             <a:endParaRPr lang="en-IN"/>
           </a:p>
@@ -5207,13 +5208,13 @@
   <p:clrMapOvr>
     <a:masterClrMapping/>
   </p:clrMapOvr>
-  <mc:AlternateContent xmlns:mc="http://schemas.openxmlformats.org/markup-compatibility/2006">
-    <mc:Choice xmlns:p14="http://schemas.microsoft.com/office/powerpoint/2010/main" Requires="p14">
+  <mc:AlternateContent xmlns:mc="http://schemas.openxmlformats.org/markup-compatibility/2006" xmlns:p14="http://schemas.microsoft.com/office/powerpoint/2010/main">
+    <mc:Choice Requires="p14">
       <p:transition spd="slow" p14:dur="1200">
         <p14:prism/>
       </p:transition>
     </mc:Choice>
-    <mc:Fallback>
+    <mc:Fallback xmlns="">
       <p:transition spd="slow">
         <p:fade/>
       </p:transition>
@@ -5412,7 +5413,7 @@
           <a:p>
             <a:fld id="{3F53D0AD-E1A3-4664-BA40-9EEE7E01C0C5}" type="datetimeFigureOut">
               <a:rPr lang="en-IN" smtClean="0"/>
-              <a:t>02-01-2021</a:t>
+              <a:t>03-01-2021</a:t>
             </a:fld>
             <a:endParaRPr lang="en-IN"/>
           </a:p>
@@ -5470,13 +5471,13 @@
   <p:clrMapOvr>
     <a:masterClrMapping/>
   </p:clrMapOvr>
-  <mc:AlternateContent xmlns:mc="http://schemas.openxmlformats.org/markup-compatibility/2006">
-    <mc:Choice xmlns:p14="http://schemas.microsoft.com/office/powerpoint/2010/main" Requires="p14">
+  <mc:AlternateContent xmlns:mc="http://schemas.openxmlformats.org/markup-compatibility/2006" xmlns:p14="http://schemas.microsoft.com/office/powerpoint/2010/main">
+    <mc:Choice Requires="p14">
       <p:transition spd="slow" p14:dur="1200">
         <p14:prism/>
       </p:transition>
     </mc:Choice>
-    <mc:Fallback>
+    <mc:Fallback xmlns="">
       <p:transition spd="slow">
         <p:fade/>
       </p:transition>
@@ -5738,7 +5739,7 @@
           <a:p>
             <a:fld id="{3F53D0AD-E1A3-4664-BA40-9EEE7E01C0C5}" type="datetimeFigureOut">
               <a:rPr lang="en-IN" smtClean="0"/>
-              <a:t>02-01-2021</a:t>
+              <a:t>03-01-2021</a:t>
             </a:fld>
             <a:endParaRPr lang="en-IN"/>
           </a:p>
@@ -5878,13 +5879,13 @@
   <p:clrMapOvr>
     <a:masterClrMapping/>
   </p:clrMapOvr>
-  <mc:AlternateContent xmlns:mc="http://schemas.openxmlformats.org/markup-compatibility/2006">
-    <mc:Choice xmlns:p14="http://schemas.microsoft.com/office/powerpoint/2010/main" Requires="p14">
+  <mc:AlternateContent xmlns:mc="http://schemas.openxmlformats.org/markup-compatibility/2006" xmlns:p14="http://schemas.microsoft.com/office/powerpoint/2010/main">
+    <mc:Choice Requires="p14">
       <p:transition spd="slow" p14:dur="1200">
         <p14:prism/>
       </p:transition>
     </mc:Choice>
-    <mc:Fallback>
+    <mc:Fallback xmlns="">
       <p:transition spd="slow">
         <p:fade/>
       </p:transition>
@@ -6083,7 +6084,7 @@
           <a:p>
             <a:fld id="{3F53D0AD-E1A3-4664-BA40-9EEE7E01C0C5}" type="datetimeFigureOut">
               <a:rPr lang="en-IN" smtClean="0"/>
-              <a:t>02-01-2021</a:t>
+              <a:t>03-01-2021</a:t>
             </a:fld>
             <a:endParaRPr lang="en-IN"/>
           </a:p>
@@ -6141,13 +6142,13 @@
   <p:clrMapOvr>
     <a:masterClrMapping/>
   </p:clrMapOvr>
-  <mc:AlternateContent xmlns:mc="http://schemas.openxmlformats.org/markup-compatibility/2006">
-    <mc:Choice xmlns:p14="http://schemas.microsoft.com/office/powerpoint/2010/main" Requires="p14">
+  <mc:AlternateContent xmlns:mc="http://schemas.openxmlformats.org/markup-compatibility/2006" xmlns:p14="http://schemas.microsoft.com/office/powerpoint/2010/main">
+    <mc:Choice Requires="p14">
       <p:transition spd="slow" p14:dur="1200">
         <p14:prism/>
       </p:transition>
     </mc:Choice>
-    <mc:Fallback>
+    <mc:Fallback xmlns="">
       <p:transition spd="slow">
         <p:fade/>
       </p:transition>
@@ -6409,7 +6410,7 @@
           <a:p>
             <a:fld id="{3F53D0AD-E1A3-4664-BA40-9EEE7E01C0C5}" type="datetimeFigureOut">
               <a:rPr lang="en-IN" smtClean="0"/>
-              <a:t>02-01-2021</a:t>
+              <a:t>03-01-2021</a:t>
             </a:fld>
             <a:endParaRPr lang="en-IN"/>
           </a:p>
@@ -6549,13 +6550,13 @@
   <p:clrMapOvr>
     <a:masterClrMapping/>
   </p:clrMapOvr>
-  <mc:AlternateContent xmlns:mc="http://schemas.openxmlformats.org/markup-compatibility/2006">
-    <mc:Choice xmlns:p14="http://schemas.microsoft.com/office/powerpoint/2010/main" Requires="p14">
+  <mc:AlternateContent xmlns:mc="http://schemas.openxmlformats.org/markup-compatibility/2006" xmlns:p14="http://schemas.microsoft.com/office/powerpoint/2010/main">
+    <mc:Choice Requires="p14">
       <p:transition spd="slow" p14:dur="1200">
         <p14:prism/>
       </p:transition>
     </mc:Choice>
-    <mc:Fallback>
+    <mc:Fallback xmlns="">
       <p:transition spd="slow">
         <p:fade/>
       </p:transition>
@@ -6814,7 +6815,7 @@
           <a:p>
             <a:fld id="{3F53D0AD-E1A3-4664-BA40-9EEE7E01C0C5}" type="datetimeFigureOut">
               <a:rPr lang="en-IN" smtClean="0"/>
-              <a:t>02-01-2021</a:t>
+              <a:t>03-01-2021</a:t>
             </a:fld>
             <a:endParaRPr lang="en-IN"/>
           </a:p>
@@ -6872,13 +6873,13 @@
   <p:clrMapOvr>
     <a:masterClrMapping/>
   </p:clrMapOvr>
-  <mc:AlternateContent xmlns:mc="http://schemas.openxmlformats.org/markup-compatibility/2006">
-    <mc:Choice xmlns:p14="http://schemas.microsoft.com/office/powerpoint/2010/main" Requires="p14">
+  <mc:AlternateContent xmlns:mc="http://schemas.openxmlformats.org/markup-compatibility/2006" xmlns:p14="http://schemas.microsoft.com/office/powerpoint/2010/main">
+    <mc:Choice Requires="p14">
       <p:transition spd="slow" p14:dur="1200">
         <p14:prism/>
       </p:transition>
     </mc:Choice>
-    <mc:Fallback>
+    <mc:Fallback xmlns="">
       <p:transition spd="slow">
         <p:fade/>
       </p:transition>
@@ -6996,7 +6997,7 @@
           <a:p>
             <a:fld id="{3F53D0AD-E1A3-4664-BA40-9EEE7E01C0C5}" type="datetimeFigureOut">
               <a:rPr lang="en-IN" smtClean="0"/>
-              <a:t>02-01-2021</a:t>
+              <a:t>03-01-2021</a:t>
             </a:fld>
             <a:endParaRPr lang="en-IN"/>
           </a:p>
@@ -7054,13 +7055,13 @@
   <p:clrMapOvr>
     <a:masterClrMapping/>
   </p:clrMapOvr>
-  <mc:AlternateContent xmlns:mc="http://schemas.openxmlformats.org/markup-compatibility/2006">
-    <mc:Choice xmlns:p14="http://schemas.microsoft.com/office/powerpoint/2010/main" Requires="p14">
+  <mc:AlternateContent xmlns:mc="http://schemas.openxmlformats.org/markup-compatibility/2006" xmlns:p14="http://schemas.microsoft.com/office/powerpoint/2010/main">
+    <mc:Choice Requires="p14">
       <p:transition spd="slow" p14:dur="1200">
         <p14:prism/>
       </p:transition>
     </mc:Choice>
-    <mc:Fallback>
+    <mc:Fallback xmlns="">
       <p:transition spd="slow">
         <p:fade/>
       </p:transition>
@@ -7188,7 +7189,7 @@
           <a:p>
             <a:fld id="{3F53D0AD-E1A3-4664-BA40-9EEE7E01C0C5}" type="datetimeFigureOut">
               <a:rPr lang="en-IN" smtClean="0"/>
-              <a:t>02-01-2021</a:t>
+              <a:t>03-01-2021</a:t>
             </a:fld>
             <a:endParaRPr lang="en-IN"/>
           </a:p>
@@ -7246,13 +7247,13 @@
   <p:clrMapOvr>
     <a:masterClrMapping/>
   </p:clrMapOvr>
-  <mc:AlternateContent xmlns:mc="http://schemas.openxmlformats.org/markup-compatibility/2006">
-    <mc:Choice xmlns:p14="http://schemas.microsoft.com/office/powerpoint/2010/main" Requires="p14">
+  <mc:AlternateContent xmlns:mc="http://schemas.openxmlformats.org/markup-compatibility/2006" xmlns:p14="http://schemas.microsoft.com/office/powerpoint/2010/main">
+    <mc:Choice Requires="p14">
       <p:transition spd="slow" p14:dur="1200">
         <p14:prism/>
       </p:transition>
     </mc:Choice>
-    <mc:Fallback>
+    <mc:Fallback xmlns="">
       <p:transition spd="slow">
         <p:fade/>
       </p:transition>
@@ -7370,7 +7371,7 @@
           <a:p>
             <a:fld id="{3F53D0AD-E1A3-4664-BA40-9EEE7E01C0C5}" type="datetimeFigureOut">
               <a:rPr lang="en-IN" smtClean="0"/>
-              <a:t>02-01-2021</a:t>
+              <a:t>03-01-2021</a:t>
             </a:fld>
             <a:endParaRPr lang="en-IN"/>
           </a:p>
@@ -7428,13 +7429,13 @@
   <p:clrMapOvr>
     <a:masterClrMapping/>
   </p:clrMapOvr>
-  <mc:AlternateContent xmlns:mc="http://schemas.openxmlformats.org/markup-compatibility/2006">
-    <mc:Choice xmlns:p14="http://schemas.microsoft.com/office/powerpoint/2010/main" Requires="p14">
+  <mc:AlternateContent xmlns:mc="http://schemas.openxmlformats.org/markup-compatibility/2006" xmlns:p14="http://schemas.microsoft.com/office/powerpoint/2010/main">
+    <mc:Choice Requires="p14">
       <p:transition spd="slow" p14:dur="1200">
         <p14:prism/>
       </p:transition>
     </mc:Choice>
-    <mc:Fallback>
+    <mc:Fallback xmlns="">
       <p:transition spd="slow">
         <p:fade/>
       </p:transition>
@@ -7629,7 +7630,7 @@
           <a:p>
             <a:fld id="{3F53D0AD-E1A3-4664-BA40-9EEE7E01C0C5}" type="datetimeFigureOut">
               <a:rPr lang="en-IN" smtClean="0"/>
-              <a:t>02-01-2021</a:t>
+              <a:t>03-01-2021</a:t>
             </a:fld>
             <a:endParaRPr lang="en-IN"/>
           </a:p>
@@ -7687,13 +7688,13 @@
   <p:clrMapOvr>
     <a:masterClrMapping/>
   </p:clrMapOvr>
-  <mc:AlternateContent xmlns:mc="http://schemas.openxmlformats.org/markup-compatibility/2006">
-    <mc:Choice xmlns:p14="http://schemas.microsoft.com/office/powerpoint/2010/main" Requires="p14">
+  <mc:AlternateContent xmlns:mc="http://schemas.openxmlformats.org/markup-compatibility/2006" xmlns:p14="http://schemas.microsoft.com/office/powerpoint/2010/main">
+    <mc:Choice Requires="p14">
       <p:transition spd="slow" p14:dur="1200">
         <p14:prism/>
       </p:transition>
     </mc:Choice>
-    <mc:Fallback>
+    <mc:Fallback xmlns="">
       <p:transition spd="slow">
         <p:fade/>
       </p:transition>
@@ -7873,7 +7874,7 @@
           <a:p>
             <a:fld id="{3F53D0AD-E1A3-4664-BA40-9EEE7E01C0C5}" type="datetimeFigureOut">
               <a:rPr lang="en-IN" smtClean="0"/>
-              <a:t>02-01-2021</a:t>
+              <a:t>03-01-2021</a:t>
             </a:fld>
             <a:endParaRPr lang="en-IN"/>
           </a:p>
@@ -7931,13 +7932,13 @@
   <p:clrMapOvr>
     <a:masterClrMapping/>
   </p:clrMapOvr>
-  <mc:AlternateContent xmlns:mc="http://schemas.openxmlformats.org/markup-compatibility/2006">
-    <mc:Choice xmlns:p14="http://schemas.microsoft.com/office/powerpoint/2010/main" Requires="p14">
+  <mc:AlternateContent xmlns:mc="http://schemas.openxmlformats.org/markup-compatibility/2006" xmlns:p14="http://schemas.microsoft.com/office/powerpoint/2010/main">
+    <mc:Choice Requires="p14">
       <p:transition spd="slow" p14:dur="1200">
         <p14:prism/>
       </p:transition>
     </mc:Choice>
-    <mc:Fallback>
+    <mc:Fallback xmlns="">
       <p:transition spd="slow">
         <p:fade/>
       </p:transition>
@@ -8259,7 +8260,7 @@
           <a:p>
             <a:fld id="{3F53D0AD-E1A3-4664-BA40-9EEE7E01C0C5}" type="datetimeFigureOut">
               <a:rPr lang="en-IN" smtClean="0"/>
-              <a:t>02-01-2021</a:t>
+              <a:t>03-01-2021</a:t>
             </a:fld>
             <a:endParaRPr lang="en-IN"/>
           </a:p>
@@ -8317,13 +8318,13 @@
   <p:clrMapOvr>
     <a:masterClrMapping/>
   </p:clrMapOvr>
-  <mc:AlternateContent xmlns:mc="http://schemas.openxmlformats.org/markup-compatibility/2006">
-    <mc:Choice xmlns:p14="http://schemas.microsoft.com/office/powerpoint/2010/main" Requires="p14">
+  <mc:AlternateContent xmlns:mc="http://schemas.openxmlformats.org/markup-compatibility/2006" xmlns:p14="http://schemas.microsoft.com/office/powerpoint/2010/main">
+    <mc:Choice Requires="p14">
       <p:transition spd="slow" p14:dur="1200">
         <p14:prism/>
       </p:transition>
     </mc:Choice>
-    <mc:Fallback>
+    <mc:Fallback xmlns="">
       <p:transition spd="slow">
         <p:fade/>
       </p:transition>
@@ -8394,7 +8395,7 @@
           <a:p>
             <a:fld id="{3F53D0AD-E1A3-4664-BA40-9EEE7E01C0C5}" type="datetimeFigureOut">
               <a:rPr lang="en-IN" smtClean="0"/>
-              <a:t>02-01-2021</a:t>
+              <a:t>03-01-2021</a:t>
             </a:fld>
             <a:endParaRPr lang="en-IN"/>
           </a:p>
@@ -8452,13 +8453,13 @@
   <p:clrMapOvr>
     <a:masterClrMapping/>
   </p:clrMapOvr>
-  <mc:AlternateContent xmlns:mc="http://schemas.openxmlformats.org/markup-compatibility/2006">
-    <mc:Choice xmlns:p14="http://schemas.microsoft.com/office/powerpoint/2010/main" Requires="p14">
+  <mc:AlternateContent xmlns:mc="http://schemas.openxmlformats.org/markup-compatibility/2006" xmlns:p14="http://schemas.microsoft.com/office/powerpoint/2010/main">
+    <mc:Choice Requires="p14">
       <p:transition spd="slow" p14:dur="1200">
         <p14:prism/>
       </p:transition>
     </mc:Choice>
-    <mc:Fallback>
+    <mc:Fallback xmlns="">
       <p:transition spd="slow">
         <p:fade/>
       </p:transition>
@@ -8501,7 +8502,7 @@
           <a:p>
             <a:fld id="{3F53D0AD-E1A3-4664-BA40-9EEE7E01C0C5}" type="datetimeFigureOut">
               <a:rPr lang="en-IN" smtClean="0"/>
-              <a:t>02-01-2021</a:t>
+              <a:t>03-01-2021</a:t>
             </a:fld>
             <a:endParaRPr lang="en-IN"/>
           </a:p>
@@ -8559,13 +8560,13 @@
   <p:clrMapOvr>
     <a:masterClrMapping/>
   </p:clrMapOvr>
-  <mc:AlternateContent xmlns:mc="http://schemas.openxmlformats.org/markup-compatibility/2006">
-    <mc:Choice xmlns:p14="http://schemas.microsoft.com/office/powerpoint/2010/main" Requires="p14">
+  <mc:AlternateContent xmlns:mc="http://schemas.openxmlformats.org/markup-compatibility/2006" xmlns:p14="http://schemas.microsoft.com/office/powerpoint/2010/main">
+    <mc:Choice Requires="p14">
       <p:transition spd="slow" p14:dur="1200">
         <p14:prism/>
       </p:transition>
     </mc:Choice>
-    <mc:Fallback>
+    <mc:Fallback xmlns="">
       <p:transition spd="slow">
         <p:fade/>
       </p:transition>
@@ -8768,7 +8769,7 @@
           <a:p>
             <a:fld id="{3F53D0AD-E1A3-4664-BA40-9EEE7E01C0C5}" type="datetimeFigureOut">
               <a:rPr lang="en-IN" smtClean="0"/>
-              <a:t>02-01-2021</a:t>
+              <a:t>03-01-2021</a:t>
             </a:fld>
             <a:endParaRPr lang="en-IN"/>
           </a:p>
@@ -8826,13 +8827,13 @@
   <p:clrMapOvr>
     <a:masterClrMapping/>
   </p:clrMapOvr>
-  <mc:AlternateContent xmlns:mc="http://schemas.openxmlformats.org/markup-compatibility/2006">
-    <mc:Choice xmlns:p14="http://schemas.microsoft.com/office/powerpoint/2010/main" Requires="p14">
+  <mc:AlternateContent xmlns:mc="http://schemas.openxmlformats.org/markup-compatibility/2006" xmlns:p14="http://schemas.microsoft.com/office/powerpoint/2010/main">
+    <mc:Choice Requires="p14">
       <p:transition spd="slow" p14:dur="1200">
         <p14:prism/>
       </p:transition>
     </mc:Choice>
-    <mc:Fallback>
+    <mc:Fallback xmlns="">
       <p:transition spd="slow">
         <p:fade/>
       </p:transition>
@@ -9085,7 +9086,7 @@
           <a:p>
             <a:fld id="{3F53D0AD-E1A3-4664-BA40-9EEE7E01C0C5}" type="datetimeFigureOut">
               <a:rPr lang="en-IN" smtClean="0"/>
-              <a:t>02-01-2021</a:t>
+              <a:t>03-01-2021</a:t>
             </a:fld>
             <a:endParaRPr lang="en-IN"/>
           </a:p>
@@ -9101,13 +9102,13 @@
   <p:clrMapOvr>
     <a:masterClrMapping/>
   </p:clrMapOvr>
-  <mc:AlternateContent xmlns:mc="http://schemas.openxmlformats.org/markup-compatibility/2006">
-    <mc:Choice xmlns:p14="http://schemas.microsoft.com/office/powerpoint/2010/main" Requires="p14">
+  <mc:AlternateContent xmlns:mc="http://schemas.openxmlformats.org/markup-compatibility/2006" xmlns:p14="http://schemas.microsoft.com/office/powerpoint/2010/main">
+    <mc:Choice Requires="p14">
       <p:transition spd="slow" p14:dur="1200">
         <p14:prism/>
       </p:transition>
     </mc:Choice>
-    <mc:Fallback>
+    <mc:Fallback xmlns="">
       <p:transition spd="slow">
         <p:fade/>
       </p:transition>
@@ -9799,7 +9800,7 @@
           <a:p>
             <a:fld id="{3F53D0AD-E1A3-4664-BA40-9EEE7E01C0C5}" type="datetimeFigureOut">
               <a:rPr lang="en-IN" smtClean="0"/>
-              <a:t>02-01-2021</a:t>
+              <a:t>03-01-2021</a:t>
             </a:fld>
             <a:endParaRPr lang="en-IN"/>
           </a:p>
@@ -9907,13 +9908,13 @@
     <p:sldLayoutId id="2147483938" r:id="rId15"/>
     <p:sldLayoutId id="2147483939" r:id="rId16"/>
   </p:sldLayoutIdLst>
-  <mc:AlternateContent xmlns:mc="http://schemas.openxmlformats.org/markup-compatibility/2006">
-    <mc:Choice xmlns:p14="http://schemas.microsoft.com/office/powerpoint/2010/main" Requires="p14">
+  <mc:AlternateContent xmlns:mc="http://schemas.openxmlformats.org/markup-compatibility/2006" xmlns:p14="http://schemas.microsoft.com/office/powerpoint/2010/main">
+    <mc:Choice Requires="p14">
       <p:transition spd="slow" p14:dur="1200">
         <p14:prism/>
       </p:transition>
     </mc:Choice>
-    <mc:Fallback>
+    <mc:Fallback xmlns="">
       <p:transition spd="slow">
         <p:fade/>
       </p:transition>
@@ -10911,13 +10912,13 @@
   <p:clrMapOvr>
     <a:masterClrMapping/>
   </p:clrMapOvr>
-  <mc:AlternateContent xmlns:mc="http://schemas.openxmlformats.org/markup-compatibility/2006">
-    <mc:Choice xmlns:p14="http://schemas.microsoft.com/office/powerpoint/2010/main" Requires="p14">
+  <mc:AlternateContent xmlns:mc="http://schemas.openxmlformats.org/markup-compatibility/2006" xmlns:p14="http://schemas.microsoft.com/office/powerpoint/2010/main">
+    <mc:Choice Requires="p14">
       <p:transition spd="slow" p14:dur="1200">
         <p14:prism/>
       </p:transition>
     </mc:Choice>
-    <mc:Fallback>
+    <mc:Fallback xmlns="">
       <p:transition spd="slow">
         <p:fade/>
       </p:transition>
@@ -10927,6 +10928,375 @@
 </file>
 
 <file path=ppt/slides/slide10.xml><?xml version="1.0" encoding="utf-8"?>
+<p:sld xmlns:a="http://schemas.openxmlformats.org/drawingml/2006/main" xmlns:r="http://schemas.openxmlformats.org/officeDocument/2006/relationships" xmlns:p="http://schemas.openxmlformats.org/presentationml/2006/main">
+  <p:cSld>
+    <p:spTree>
+      <p:nvGrpSpPr>
+        <p:cNvPr id="1" name=""/>
+        <p:cNvGrpSpPr/>
+        <p:nvPr/>
+      </p:nvGrpSpPr>
+      <p:grpSpPr>
+        <a:xfrm>
+          <a:off x="0" y="0"/>
+          <a:ext cx="0" cy="0"/>
+          <a:chOff x="0" y="0"/>
+          <a:chExt cx="0" cy="0"/>
+        </a:xfrm>
+      </p:grpSpPr>
+      <p:sp>
+        <p:nvSpPr>
+          <p:cNvPr id="2" name="Title 1">
+            <a:extLst>
+              <a:ext uri="{FF2B5EF4-FFF2-40B4-BE49-F238E27FC236}">
+                <a16:creationId xmlns:a16="http://schemas.microsoft.com/office/drawing/2014/main" id="{5CDD1391-07DC-431B-B81E-A3E454174DE7}"/>
+              </a:ext>
+            </a:extLst>
+          </p:cNvPr>
+          <p:cNvSpPr>
+            <a:spLocks noGrp="1"/>
+          </p:cNvSpPr>
+          <p:nvPr>
+            <p:ph type="title"/>
+          </p:nvPr>
+        </p:nvSpPr>
+        <p:spPr>
+          <a:xfrm>
+            <a:off x="5096823" y="1211386"/>
+            <a:ext cx="4361391" cy="510120"/>
+          </a:xfrm>
+        </p:spPr>
+        <p:txBody>
+          <a:bodyPr>
+            <a:noAutofit/>
+          </a:bodyPr>
+          <a:lstStyle/>
+          <a:p>
+            <a:r>
+              <a:rPr lang="en-US" sz="2800" b="1" dirty="0">
+                <a:solidFill>
+                  <a:schemeClr val="accent2">
+                    <a:lumMod val="75000"/>
+                  </a:schemeClr>
+                </a:solidFill>
+                <a:latin typeface="Arial" panose="020B0604020202020204" pitchFamily="34" charset="0"/>
+                <a:cs typeface="Arial" panose="020B0604020202020204" pitchFamily="34" charset="0"/>
+              </a:rPr>
+              <a:t>GRAPHIC DESIGN</a:t>
+            </a:r>
+            <a:endParaRPr lang="en-IN" sz="2800" b="1" dirty="0">
+              <a:solidFill>
+                <a:schemeClr val="accent2">
+                  <a:lumMod val="75000"/>
+                </a:schemeClr>
+              </a:solidFill>
+              <a:latin typeface="Arial" panose="020B0604020202020204" pitchFamily="34" charset="0"/>
+              <a:cs typeface="Arial" panose="020B0604020202020204" pitchFamily="34" charset="0"/>
+            </a:endParaRPr>
+          </a:p>
+        </p:txBody>
+      </p:sp>
+      <p:sp>
+        <p:nvSpPr>
+          <p:cNvPr id="4" name="Text Placeholder 3">
+            <a:extLst>
+              <a:ext uri="{FF2B5EF4-FFF2-40B4-BE49-F238E27FC236}">
+                <a16:creationId xmlns:a16="http://schemas.microsoft.com/office/drawing/2014/main" id="{316A7AF4-13DE-40BB-9D7D-7BF15D649660}"/>
+              </a:ext>
+            </a:extLst>
+          </p:cNvPr>
+          <p:cNvSpPr>
+            <a:spLocks noGrp="1"/>
+          </p:cNvSpPr>
+          <p:nvPr>
+            <p:ph type="body" sz="half" idx="2"/>
+          </p:nvPr>
+        </p:nvSpPr>
+        <p:spPr>
+          <a:xfrm>
+            <a:off x="5096823" y="1905000"/>
+            <a:ext cx="4847277" cy="1390650"/>
+          </a:xfrm>
+        </p:spPr>
+        <p:txBody>
+          <a:bodyPr>
+            <a:noAutofit/>
+          </a:bodyPr>
+          <a:lstStyle/>
+          <a:p>
+            <a:r>
+              <a:rPr lang="en-US" sz="2000" b="1" i="0" dirty="0">
+                <a:solidFill>
+                  <a:schemeClr val="tx1"/>
+                </a:solidFill>
+                <a:effectLst/>
+                <a:latin typeface="Arial" panose="020B0604020202020204" pitchFamily="34" charset="0"/>
+                <a:cs typeface="Arial" panose="020B0604020202020204" pitchFamily="34" charset="0"/>
+              </a:rPr>
+              <a:t>Graphic design</a:t>
+            </a:r>
+            <a:r>
+              <a:rPr lang="en-US" sz="2000" b="0" i="0" dirty="0">
+                <a:solidFill>
+                  <a:schemeClr val="tx1"/>
+                </a:solidFill>
+                <a:effectLst/>
+                <a:latin typeface="Arial" panose="020B0604020202020204" pitchFamily="34" charset="0"/>
+                <a:cs typeface="Arial" panose="020B0604020202020204" pitchFamily="34" charset="0"/>
+              </a:rPr>
+              <a:t> is the process of visual communication through the use of </a:t>
+            </a:r>
+            <a:r>
+              <a:rPr lang="en-US" sz="2000" b="0" i="0" u="none" strike="noStrike" dirty="0">
+                <a:solidFill>
+                  <a:schemeClr val="tx1"/>
+                </a:solidFill>
+                <a:effectLst/>
+                <a:latin typeface="Arial" panose="020B0604020202020204" pitchFamily="34" charset="0"/>
+                <a:cs typeface="Arial" panose="020B0604020202020204" pitchFamily="34" charset="0"/>
+              </a:rPr>
+              <a:t>typography</a:t>
+            </a:r>
+            <a:r>
+              <a:rPr lang="en-US" sz="2000" b="0" i="0" dirty="0">
+                <a:solidFill>
+                  <a:schemeClr val="tx1"/>
+                </a:solidFill>
+                <a:effectLst/>
+                <a:latin typeface="Arial" panose="020B0604020202020204" pitchFamily="34" charset="0"/>
+                <a:cs typeface="Arial" panose="020B0604020202020204" pitchFamily="34" charset="0"/>
+              </a:rPr>
+              <a:t>, </a:t>
+            </a:r>
+            <a:r>
+              <a:rPr lang="en-US" sz="2000" b="0" i="0" u="none" strike="noStrike" dirty="0">
+                <a:solidFill>
+                  <a:schemeClr val="tx1"/>
+                </a:solidFill>
+                <a:effectLst/>
+                <a:latin typeface="Arial" panose="020B0604020202020204" pitchFamily="34" charset="0"/>
+                <a:cs typeface="Arial" panose="020B0604020202020204" pitchFamily="34" charset="0"/>
+              </a:rPr>
+              <a:t>photography</a:t>
+            </a:r>
+            <a:r>
+              <a:rPr lang="en-US" sz="2000" b="0" i="0" dirty="0">
+                <a:solidFill>
+                  <a:schemeClr val="tx1"/>
+                </a:solidFill>
+                <a:effectLst/>
+                <a:latin typeface="Arial" panose="020B0604020202020204" pitchFamily="34" charset="0"/>
+                <a:cs typeface="Arial" panose="020B0604020202020204" pitchFamily="34" charset="0"/>
+              </a:rPr>
+              <a:t>, </a:t>
+            </a:r>
+            <a:r>
+              <a:rPr lang="en-US" sz="2000" b="0" i="0" u="none" strike="noStrike" dirty="0">
+                <a:solidFill>
+                  <a:schemeClr val="tx1"/>
+                </a:solidFill>
+                <a:effectLst/>
+                <a:latin typeface="Arial" panose="020B0604020202020204" pitchFamily="34" charset="0"/>
+                <a:cs typeface="Arial" panose="020B0604020202020204" pitchFamily="34" charset="0"/>
+              </a:rPr>
+              <a:t>iconography</a:t>
+            </a:r>
+            <a:r>
+              <a:rPr lang="en-US" sz="2000" b="0" i="0" dirty="0">
+                <a:solidFill>
+                  <a:schemeClr val="tx1"/>
+                </a:solidFill>
+                <a:effectLst/>
+                <a:latin typeface="Arial" panose="020B0604020202020204" pitchFamily="34" charset="0"/>
+                <a:cs typeface="Arial" panose="020B0604020202020204" pitchFamily="34" charset="0"/>
+              </a:rPr>
+              <a:t> and </a:t>
+            </a:r>
+            <a:r>
+              <a:rPr lang="en-US" sz="2000" b="0" i="0" u="none" strike="noStrike" dirty="0">
+                <a:solidFill>
+                  <a:schemeClr val="tx1"/>
+                </a:solidFill>
+                <a:effectLst/>
+                <a:latin typeface="Arial" panose="020B0604020202020204" pitchFamily="34" charset="0"/>
+                <a:cs typeface="Arial" panose="020B0604020202020204" pitchFamily="34" charset="0"/>
+              </a:rPr>
+              <a:t>illustration.</a:t>
+            </a:r>
+            <a:endParaRPr lang="en-IN" sz="2000" dirty="0">
+              <a:solidFill>
+                <a:schemeClr val="tx1"/>
+              </a:solidFill>
+              <a:latin typeface="Arial" panose="020B0604020202020204" pitchFamily="34" charset="0"/>
+              <a:cs typeface="Arial" panose="020B0604020202020204" pitchFamily="34" charset="0"/>
+            </a:endParaRPr>
+          </a:p>
+        </p:txBody>
+      </p:sp>
+      <p:pic>
+        <p:nvPicPr>
+          <p:cNvPr id="7" name="Content Placeholder 6">
+            <a:extLst>
+              <a:ext uri="{FF2B5EF4-FFF2-40B4-BE49-F238E27FC236}">
+                <a16:creationId xmlns:a16="http://schemas.microsoft.com/office/drawing/2014/main" id="{AB43B994-48DF-4CAE-A3C1-A4EFA3E04F3A}"/>
+              </a:ext>
+            </a:extLst>
+          </p:cNvPr>
+          <p:cNvPicPr>
+            <a:picLocks noGrp="1" noChangeAspect="1"/>
+          </p:cNvPicPr>
+          <p:nvPr>
+            <p:ph idx="1"/>
+          </p:nvPr>
+        </p:nvPicPr>
+        <p:blipFill>
+          <a:blip r:embed="rId2">
+            <a:extLst>
+              <a:ext uri="{28A0092B-C50C-407E-A947-70E740481C1C}">
+                <a14:useLocalDpi xmlns:a14="http://schemas.microsoft.com/office/drawing/2010/main" val="0"/>
+              </a:ext>
+            </a:extLst>
+          </a:blip>
+          <a:srcRect/>
+          <a:stretch/>
+        </p:blipFill>
+        <p:spPr>
+          <a:xfrm>
+            <a:off x="218966" y="1114259"/>
+            <a:ext cx="4724620" cy="3781591"/>
+          </a:xfrm>
+          <a:prstGeom prst="rect">
+            <a:avLst/>
+          </a:prstGeom>
+          <a:ln>
+            <a:noFill/>
+          </a:ln>
+          <a:effectLst>
+            <a:softEdge rad="112500"/>
+          </a:effectLst>
+        </p:spPr>
+      </p:pic>
+      <p:sp>
+        <p:nvSpPr>
+          <p:cNvPr id="3" name="TextBox 2">
+            <a:extLst>
+              <a:ext uri="{FF2B5EF4-FFF2-40B4-BE49-F238E27FC236}">
+                <a16:creationId xmlns:a16="http://schemas.microsoft.com/office/drawing/2014/main" id="{647B3340-D20C-47C5-9496-BA43A4EC1784}"/>
+              </a:ext>
+            </a:extLst>
+          </p:cNvPr>
+          <p:cNvSpPr txBox="1"/>
+          <p:nvPr/>
+        </p:nvSpPr>
+        <p:spPr>
+          <a:xfrm>
+            <a:off x="5096823" y="3295650"/>
+            <a:ext cx="4563644" cy="1908215"/>
+          </a:xfrm>
+          <a:prstGeom prst="rect">
+            <a:avLst/>
+          </a:prstGeom>
+          <a:noFill/>
+        </p:spPr>
+        <p:txBody>
+          <a:bodyPr wrap="square" rtlCol="0">
+            <a:spAutoFit/>
+          </a:bodyPr>
+          <a:lstStyle/>
+          <a:p>
+            <a:r>
+              <a:rPr lang="en-US" sz="2000" dirty="0">
+                <a:latin typeface="Arial" panose="020B0604020202020204" pitchFamily="34" charset="0"/>
+                <a:cs typeface="Arial" panose="020B0604020202020204" pitchFamily="34" charset="0"/>
+              </a:rPr>
+              <a:t>We offer these graphic design services such as,</a:t>
+            </a:r>
+          </a:p>
+          <a:p>
+            <a:pPr marL="285750" indent="-285750">
+              <a:buFont typeface="Arial" panose="020B0604020202020204" pitchFamily="34" charset="0"/>
+              <a:buChar char="•"/>
+            </a:pPr>
+            <a:r>
+              <a:rPr lang="en-US" sz="2000" dirty="0">
+                <a:solidFill>
+                  <a:schemeClr val="accent1">
+                    <a:lumMod val="75000"/>
+                  </a:schemeClr>
+                </a:solidFill>
+                <a:latin typeface="Arial" panose="020B0604020202020204" pitchFamily="34" charset="0"/>
+                <a:cs typeface="Arial" panose="020B0604020202020204" pitchFamily="34" charset="0"/>
+              </a:rPr>
+              <a:t>Logo Design</a:t>
+            </a:r>
+          </a:p>
+          <a:p>
+            <a:pPr marL="285750" indent="-285750">
+              <a:buFont typeface="Arial" panose="020B0604020202020204" pitchFamily="34" charset="0"/>
+              <a:buChar char="•"/>
+            </a:pPr>
+            <a:r>
+              <a:rPr lang="en-US" sz="2000" dirty="0">
+                <a:solidFill>
+                  <a:schemeClr val="accent1">
+                    <a:lumMod val="75000"/>
+                  </a:schemeClr>
+                </a:solidFill>
+                <a:latin typeface="Arial" panose="020B0604020202020204" pitchFamily="34" charset="0"/>
+                <a:cs typeface="Arial" panose="020B0604020202020204" pitchFamily="34" charset="0"/>
+              </a:rPr>
+              <a:t>UI Design</a:t>
+            </a:r>
+          </a:p>
+          <a:p>
+            <a:pPr marL="285750" indent="-285750">
+              <a:buFont typeface="Arial" panose="020B0604020202020204" pitchFamily="34" charset="0"/>
+              <a:buChar char="•"/>
+            </a:pPr>
+            <a:r>
+              <a:rPr lang="en-US" sz="2000" dirty="0">
+                <a:solidFill>
+                  <a:schemeClr val="accent1">
+                    <a:lumMod val="75000"/>
+                  </a:schemeClr>
+                </a:solidFill>
+                <a:latin typeface="Arial" panose="020B0604020202020204" pitchFamily="34" charset="0"/>
+                <a:cs typeface="Arial" panose="020B0604020202020204" pitchFamily="34" charset="0"/>
+              </a:rPr>
+              <a:t>Publication Graphic Design</a:t>
+            </a:r>
+          </a:p>
+          <a:p>
+            <a:endParaRPr lang="en-IN" dirty="0"/>
+          </a:p>
+        </p:txBody>
+      </p:sp>
+    </p:spTree>
+    <p:extLst>
+      <p:ext uri="{BB962C8B-B14F-4D97-AF65-F5344CB8AC3E}">
+        <p14:creationId xmlns:p14="http://schemas.microsoft.com/office/powerpoint/2010/main" val="3136277155"/>
+      </p:ext>
+    </p:extLst>
+  </p:cSld>
+  <p:clrMapOvr>
+    <a:masterClrMapping/>
+  </p:clrMapOvr>
+  <mc:AlternateContent xmlns:mc="http://schemas.openxmlformats.org/markup-compatibility/2006" xmlns:p14="http://schemas.microsoft.com/office/powerpoint/2010/main">
+    <mc:Choice Requires="p14">
+      <p:transition spd="slow" p14:dur="1200">
+        <p14:prism/>
+      </p:transition>
+    </mc:Choice>
+    <mc:Fallback xmlns="">
+      <p:transition spd="slow">
+        <p:fade/>
+      </p:transition>
+    </mc:Fallback>
+  </mc:AlternateContent>
+</p:sld>
+</file>
+
+<file path=ppt/slides/slide11.xml><?xml version="1.0" encoding="utf-8"?>
 <p:sld xmlns:a="http://schemas.openxmlformats.org/drawingml/2006/main" xmlns:r="http://schemas.openxmlformats.org/officeDocument/2006/relationships" xmlns:p="http://schemas.openxmlformats.org/presentationml/2006/main">
   <p:cSld>
     <p:bg>
@@ -11003,13 +11373,13 @@
   <p:clrMapOvr>
     <a:masterClrMapping/>
   </p:clrMapOvr>
-  <mc:AlternateContent xmlns:mc="http://schemas.openxmlformats.org/markup-compatibility/2006">
-    <mc:Choice xmlns:p14="http://schemas.microsoft.com/office/powerpoint/2010/main" Requires="p14">
+  <mc:AlternateContent xmlns:mc="http://schemas.openxmlformats.org/markup-compatibility/2006" xmlns:p14="http://schemas.microsoft.com/office/powerpoint/2010/main">
+    <mc:Choice Requires="p14">
       <p:transition spd="slow" p14:dur="1200">
         <p14:prism/>
       </p:transition>
     </mc:Choice>
-    <mc:Fallback>
+    <mc:Fallback xmlns="">
       <p:transition spd="slow">
         <p:fade/>
       </p:transition>
@@ -11196,13 +11566,13 @@
   <p:clrMapOvr>
     <a:masterClrMapping/>
   </p:clrMapOvr>
-  <mc:AlternateContent xmlns:mc="http://schemas.openxmlformats.org/markup-compatibility/2006">
-    <mc:Choice xmlns:p14="http://schemas.microsoft.com/office/powerpoint/2010/main" Requires="p14">
+  <mc:AlternateContent xmlns:mc="http://schemas.openxmlformats.org/markup-compatibility/2006" xmlns:p14="http://schemas.microsoft.com/office/powerpoint/2010/main">
+    <mc:Choice Requires="p14">
       <p:transition spd="slow" p14:dur="1200">
         <p14:prism/>
       </p:transition>
     </mc:Choice>
-    <mc:Fallback>
+    <mc:Fallback xmlns="">
       <p:transition spd="slow">
         <p:fade/>
       </p:transition>
@@ -11212,6 +11582,280 @@
 </file>
 
 <file path=ppt/slides/slide3.xml><?xml version="1.0" encoding="utf-8"?>
+<p:sld xmlns:a="http://schemas.openxmlformats.org/drawingml/2006/main" xmlns:r="http://schemas.openxmlformats.org/officeDocument/2006/relationships" xmlns:p="http://schemas.openxmlformats.org/presentationml/2006/main">
+  <p:cSld>
+    <p:spTree>
+      <p:nvGrpSpPr>
+        <p:cNvPr id="1" name=""/>
+        <p:cNvGrpSpPr/>
+        <p:nvPr/>
+      </p:nvGrpSpPr>
+      <p:grpSpPr>
+        <a:xfrm>
+          <a:off x="0" y="0"/>
+          <a:ext cx="0" cy="0"/>
+          <a:chOff x="0" y="0"/>
+          <a:chExt cx="0" cy="0"/>
+        </a:xfrm>
+      </p:grpSpPr>
+      <p:sp>
+        <p:nvSpPr>
+          <p:cNvPr id="2" name="Title 1">
+            <a:extLst>
+              <a:ext uri="{FF2B5EF4-FFF2-40B4-BE49-F238E27FC236}">
+                <a16:creationId xmlns:a16="http://schemas.microsoft.com/office/drawing/2014/main" id="{E0078969-3F4B-413B-B0D1-3DAC4F3E8E15}"/>
+              </a:ext>
+            </a:extLst>
+          </p:cNvPr>
+          <p:cNvSpPr>
+            <a:spLocks noGrp="1"/>
+          </p:cNvSpPr>
+          <p:nvPr>
+            <p:ph type="title"/>
+          </p:nvPr>
+        </p:nvSpPr>
+        <p:spPr>
+          <a:xfrm>
+            <a:off x="439209" y="714375"/>
+            <a:ext cx="8596668" cy="666750"/>
+          </a:xfrm>
+        </p:spPr>
+        <p:txBody>
+          <a:bodyPr/>
+          <a:lstStyle/>
+          <a:p>
+            <a:r>
+              <a:rPr lang="en-US" b="1" dirty="0">
+                <a:solidFill>
+                  <a:schemeClr val="accent2">
+                    <a:lumMod val="75000"/>
+                  </a:schemeClr>
+                </a:solidFill>
+                <a:latin typeface="Arial" panose="020B0604020202020204" pitchFamily="34" charset="0"/>
+                <a:cs typeface="Arial" panose="020B0604020202020204" pitchFamily="34" charset="0"/>
+              </a:rPr>
+              <a:t>OBJECTIVE</a:t>
+            </a:r>
+            <a:endParaRPr lang="en-IN" b="1" dirty="0">
+              <a:solidFill>
+                <a:schemeClr val="accent2">
+                  <a:lumMod val="75000"/>
+                </a:schemeClr>
+              </a:solidFill>
+              <a:latin typeface="Arial" panose="020B0604020202020204" pitchFamily="34" charset="0"/>
+              <a:cs typeface="Arial" panose="020B0604020202020204" pitchFamily="34" charset="0"/>
+            </a:endParaRPr>
+          </a:p>
+        </p:txBody>
+      </p:sp>
+      <p:sp>
+        <p:nvSpPr>
+          <p:cNvPr id="4" name="TextBox 3">
+            <a:extLst>
+              <a:ext uri="{FF2B5EF4-FFF2-40B4-BE49-F238E27FC236}">
+                <a16:creationId xmlns:a16="http://schemas.microsoft.com/office/drawing/2014/main" id="{C317C51E-AF72-44AB-9232-8A2C22558559}"/>
+              </a:ext>
+            </a:extLst>
+          </p:cNvPr>
+          <p:cNvSpPr txBox="1"/>
+          <p:nvPr/>
+        </p:nvSpPr>
+        <p:spPr>
+          <a:xfrm>
+            <a:off x="372534" y="2090172"/>
+            <a:ext cx="9666816" cy="2677656"/>
+          </a:xfrm>
+          <a:prstGeom prst="rect">
+            <a:avLst/>
+          </a:prstGeom>
+          <a:noFill/>
+        </p:spPr>
+        <p:txBody>
+          <a:bodyPr wrap="square" rtlCol="0">
+            <a:spAutoFit/>
+          </a:bodyPr>
+          <a:lstStyle/>
+          <a:p>
+            <a:pPr marL="342900" indent="-342900">
+              <a:buFont typeface="Arial" panose="020B0604020202020204" pitchFamily="34" charset="0"/>
+              <a:buChar char="•"/>
+            </a:pPr>
+            <a:r>
+              <a:rPr lang="en-US" sz="2400" dirty="0">
+                <a:solidFill>
+                  <a:schemeClr val="accent1">
+                    <a:lumMod val="75000"/>
+                  </a:schemeClr>
+                </a:solidFill>
+                <a:latin typeface="Arial" panose="020B0604020202020204" pitchFamily="34" charset="0"/>
+                <a:cs typeface="Arial" panose="020B0604020202020204" pitchFamily="34" charset="0"/>
+              </a:rPr>
+              <a:t>Do their business across the world</a:t>
+            </a:r>
+          </a:p>
+          <a:p>
+            <a:pPr marL="342900" indent="-342900">
+              <a:buFont typeface="Arial" panose="020B0604020202020204" pitchFamily="34" charset="0"/>
+              <a:buChar char="•"/>
+            </a:pPr>
+            <a:r>
+              <a:rPr lang="en-US" sz="2400" dirty="0">
+                <a:solidFill>
+                  <a:schemeClr val="accent1">
+                    <a:lumMod val="75000"/>
+                  </a:schemeClr>
+                </a:solidFill>
+                <a:latin typeface="Arial" panose="020B0604020202020204" pitchFamily="34" charset="0"/>
+                <a:cs typeface="Arial" panose="020B0604020202020204" pitchFamily="34" charset="0"/>
+              </a:rPr>
+              <a:t>Build a brand</a:t>
+            </a:r>
+          </a:p>
+          <a:p>
+            <a:pPr marL="342900" indent="-342900">
+              <a:buFont typeface="Arial" panose="020B0604020202020204" pitchFamily="34" charset="0"/>
+              <a:buChar char="•"/>
+            </a:pPr>
+            <a:r>
+              <a:rPr lang="en-US" sz="2400" dirty="0">
+                <a:solidFill>
+                  <a:schemeClr val="accent1">
+                    <a:lumMod val="75000"/>
+                  </a:schemeClr>
+                </a:solidFill>
+                <a:latin typeface="Arial" panose="020B0604020202020204" pitchFamily="34" charset="0"/>
+                <a:cs typeface="Arial" panose="020B0604020202020204" pitchFamily="34" charset="0"/>
+              </a:rPr>
+              <a:t>Increase revenue</a:t>
+            </a:r>
+          </a:p>
+          <a:p>
+            <a:pPr marL="342900" indent="-342900">
+              <a:buFont typeface="Arial" panose="020B0604020202020204" pitchFamily="34" charset="0"/>
+              <a:buChar char="•"/>
+            </a:pPr>
+            <a:r>
+              <a:rPr lang="en-US" sz="2400" dirty="0">
+                <a:solidFill>
+                  <a:schemeClr val="accent1">
+                    <a:lumMod val="75000"/>
+                  </a:schemeClr>
+                </a:solidFill>
+                <a:latin typeface="Arial" panose="020B0604020202020204" pitchFamily="34" charset="0"/>
+                <a:cs typeface="Arial" panose="020B0604020202020204" pitchFamily="34" charset="0"/>
+              </a:rPr>
+              <a:t>Manage online reputation</a:t>
+            </a:r>
+          </a:p>
+          <a:p>
+            <a:pPr marL="342900" indent="-342900">
+              <a:buFont typeface="Arial" panose="020B0604020202020204" pitchFamily="34" charset="0"/>
+              <a:buChar char="•"/>
+            </a:pPr>
+            <a:r>
+              <a:rPr lang="en-US" sz="2400" b="0" i="0" dirty="0">
+                <a:solidFill>
+                  <a:schemeClr val="accent1">
+                    <a:lumMod val="75000"/>
+                  </a:schemeClr>
+                </a:solidFill>
+                <a:effectLst/>
+                <a:latin typeface="Arial" panose="020B0604020202020204" pitchFamily="34" charset="0"/>
+                <a:cs typeface="Arial" panose="020B0604020202020204" pitchFamily="34" charset="0"/>
+              </a:rPr>
+              <a:t>Providing a unique customer experience</a:t>
+            </a:r>
+          </a:p>
+          <a:p>
+            <a:pPr marL="342900" indent="-342900">
+              <a:buFont typeface="Arial" panose="020B0604020202020204" pitchFamily="34" charset="0"/>
+              <a:buChar char="•"/>
+            </a:pPr>
+            <a:r>
+              <a:rPr lang="en-IN" sz="2400" dirty="0">
+                <a:solidFill>
+                  <a:schemeClr val="accent1">
+                    <a:lumMod val="75000"/>
+                  </a:schemeClr>
+                </a:solidFill>
+                <a:latin typeface="Arial" panose="020B0604020202020204" pitchFamily="34" charset="0"/>
+                <a:cs typeface="Arial" panose="020B0604020202020204" pitchFamily="34" charset="0"/>
+              </a:rPr>
+              <a:t>Decrease the paper waste</a:t>
+            </a:r>
+          </a:p>
+          <a:p>
+            <a:pPr marL="342900" indent="-342900">
+              <a:buFont typeface="Arial" panose="020B0604020202020204" pitchFamily="34" charset="0"/>
+              <a:buChar char="•"/>
+            </a:pPr>
+            <a:r>
+              <a:rPr lang="en-US" sz="2400" dirty="0">
+                <a:solidFill>
+                  <a:schemeClr val="accent1">
+                    <a:lumMod val="75000"/>
+                  </a:schemeClr>
+                </a:solidFill>
+                <a:latin typeface="Arial" panose="020B0604020202020204" pitchFamily="34" charset="0"/>
+                <a:cs typeface="Arial" panose="020B0604020202020204" pitchFamily="34" charset="0"/>
+              </a:rPr>
+              <a:t>O</a:t>
+            </a:r>
+            <a:r>
+              <a:rPr lang="en-US" sz="2400" i="0" dirty="0">
+                <a:solidFill>
+                  <a:schemeClr val="accent1">
+                    <a:lumMod val="75000"/>
+                  </a:schemeClr>
+                </a:solidFill>
+                <a:effectLst/>
+                <a:latin typeface="Arial" panose="020B0604020202020204" pitchFamily="34" charset="0"/>
+                <a:cs typeface="Arial" panose="020B0604020202020204" pitchFamily="34" charset="0"/>
+              </a:rPr>
+              <a:t>pportunities</a:t>
+            </a:r>
+            <a:r>
+              <a:rPr lang="en-US" sz="2400" b="0" i="0" dirty="0">
+                <a:solidFill>
+                  <a:schemeClr val="accent1">
+                    <a:lumMod val="75000"/>
+                  </a:schemeClr>
+                </a:solidFill>
+                <a:effectLst/>
+                <a:latin typeface="Arial" panose="020B0604020202020204" pitchFamily="34" charset="0"/>
+                <a:cs typeface="Arial" panose="020B0604020202020204" pitchFamily="34" charset="0"/>
+              </a:rPr>
+              <a:t> to manage your business from anywhere in the world</a:t>
+            </a:r>
+          </a:p>
+        </p:txBody>
+      </p:sp>
+    </p:spTree>
+    <p:extLst>
+      <p:ext uri="{BB962C8B-B14F-4D97-AF65-F5344CB8AC3E}">
+        <p14:creationId xmlns:p14="http://schemas.microsoft.com/office/powerpoint/2010/main" val="2082522932"/>
+      </p:ext>
+    </p:extLst>
+  </p:cSld>
+  <p:clrMapOvr>
+    <a:masterClrMapping/>
+  </p:clrMapOvr>
+  <mc:AlternateContent xmlns:mc="http://schemas.openxmlformats.org/markup-compatibility/2006" xmlns:p14="http://schemas.microsoft.com/office/powerpoint/2010/main">
+    <mc:Choice Requires="p14">
+      <p:transition spd="slow" p14:dur="1200">
+        <p14:prism/>
+      </p:transition>
+    </mc:Choice>
+    <mc:Fallback xmlns="">
+      <p:transition spd="slow">
+        <p:fade/>
+      </p:transition>
+    </mc:Fallback>
+  </mc:AlternateContent>
+</p:sld>
+</file>
+
+<file path=ppt/slides/slide4.xml><?xml version="1.0" encoding="utf-8"?>
 <p:sld xmlns:a="http://schemas.openxmlformats.org/drawingml/2006/main" xmlns:r="http://schemas.openxmlformats.org/officeDocument/2006/relationships" xmlns:p="http://schemas.openxmlformats.org/presentationml/2006/main">
   <p:cSld>
     <p:spTree>
@@ -11319,13 +11963,13 @@
   <p:clrMapOvr>
     <a:masterClrMapping/>
   </p:clrMapOvr>
-  <mc:AlternateContent xmlns:mc="http://schemas.openxmlformats.org/markup-compatibility/2006">
-    <mc:Choice xmlns:p14="http://schemas.microsoft.com/office/powerpoint/2010/main" Requires="p14">
+  <mc:AlternateContent xmlns:mc="http://schemas.openxmlformats.org/markup-compatibility/2006" xmlns:p14="http://schemas.microsoft.com/office/powerpoint/2010/main">
+    <mc:Choice Requires="p14">
       <p:transition spd="slow" p14:dur="1200">
         <p14:prism/>
       </p:transition>
     </mc:Choice>
-    <mc:Fallback>
+    <mc:Fallback xmlns="">
       <p:transition spd="slow">
         <p:fade/>
       </p:transition>
@@ -11334,7 +11978,7 @@
 </p:sld>
 </file>
 
-<file path=ppt/slides/slide4.xml><?xml version="1.0" encoding="utf-8"?>
+<file path=ppt/slides/slide5.xml><?xml version="1.0" encoding="utf-8"?>
 <p:sld xmlns:a="http://schemas.openxmlformats.org/drawingml/2006/main" xmlns:r="http://schemas.openxmlformats.org/officeDocument/2006/relationships" xmlns:p="http://schemas.openxmlformats.org/presentationml/2006/main">
   <p:cSld>
     <p:spTree>
@@ -11673,13 +12317,13 @@
   <p:clrMapOvr>
     <a:masterClrMapping/>
   </p:clrMapOvr>
-  <mc:AlternateContent xmlns:mc="http://schemas.openxmlformats.org/markup-compatibility/2006">
-    <mc:Choice xmlns:p14="http://schemas.microsoft.com/office/powerpoint/2010/main" Requires="p14">
+  <mc:AlternateContent xmlns:mc="http://schemas.openxmlformats.org/markup-compatibility/2006" xmlns:p14="http://schemas.microsoft.com/office/powerpoint/2010/main">
+    <mc:Choice Requires="p14">
       <p:transition spd="slow" p14:dur="1200">
         <p14:prism/>
       </p:transition>
     </mc:Choice>
-    <mc:Fallback>
+    <mc:Fallback xmlns="">
       <p:transition spd="slow">
         <p:fade/>
       </p:transition>
@@ -11688,7 +12332,7 @@
 </p:sld>
 </file>
 
-<file path=ppt/slides/slide5.xml><?xml version="1.0" encoding="utf-8"?>
+<file path=ppt/slides/slide6.xml><?xml version="1.0" encoding="utf-8"?>
 <p:sld xmlns:a="http://schemas.openxmlformats.org/drawingml/2006/main" xmlns:r="http://schemas.openxmlformats.org/officeDocument/2006/relationships" xmlns:p="http://schemas.openxmlformats.org/presentationml/2006/main">
   <p:cSld>
     <p:spTree>
@@ -11860,13 +12504,13 @@
   <p:clrMapOvr>
     <a:masterClrMapping/>
   </p:clrMapOvr>
-  <mc:AlternateContent xmlns:mc="http://schemas.openxmlformats.org/markup-compatibility/2006">
-    <mc:Choice xmlns:p14="http://schemas.microsoft.com/office/powerpoint/2010/main" Requires="p14">
+  <mc:AlternateContent xmlns:mc="http://schemas.openxmlformats.org/markup-compatibility/2006" xmlns:p14="http://schemas.microsoft.com/office/powerpoint/2010/main">
+    <mc:Choice Requires="p14">
       <p:transition spd="slow" p14:dur="1200">
         <p14:prism/>
       </p:transition>
     </mc:Choice>
-    <mc:Fallback>
+    <mc:Fallback xmlns="">
       <p:transition spd="slow">
         <p:fade/>
       </p:transition>
@@ -11875,7 +12519,7 @@
 </p:sld>
 </file>
 
-<file path=ppt/slides/slide6.xml><?xml version="1.0" encoding="utf-8"?>
+<file path=ppt/slides/slide7.xml><?xml version="1.0" encoding="utf-8"?>
 <p:sld xmlns:a="http://schemas.openxmlformats.org/drawingml/2006/main" xmlns:r="http://schemas.openxmlformats.org/officeDocument/2006/relationships" xmlns:p="http://schemas.openxmlformats.org/presentationml/2006/main">
   <p:cSld>
     <p:spTree>
@@ -12228,13 +12872,13 @@
   <p:clrMapOvr>
     <a:masterClrMapping/>
   </p:clrMapOvr>
-  <mc:AlternateContent xmlns:mc="http://schemas.openxmlformats.org/markup-compatibility/2006">
-    <mc:Choice xmlns:p14="http://schemas.microsoft.com/office/powerpoint/2010/main" Requires="p14">
+  <mc:AlternateContent xmlns:mc="http://schemas.openxmlformats.org/markup-compatibility/2006" xmlns:p14="http://schemas.microsoft.com/office/powerpoint/2010/main">
+    <mc:Choice Requires="p14">
       <p:transition spd="slow" p14:dur="1200">
         <p14:prism/>
       </p:transition>
     </mc:Choice>
-    <mc:Fallback>
+    <mc:Fallback xmlns="">
       <p:transition spd="slow">
         <p:fade/>
       </p:transition>
@@ -12243,7 +12887,7 @@
 </p:sld>
 </file>
 
-<file path=ppt/slides/slide7.xml><?xml version="1.0" encoding="utf-8"?>
+<file path=ppt/slides/slide8.xml><?xml version="1.0" encoding="utf-8"?>
 <p:sld xmlns:a="http://schemas.openxmlformats.org/drawingml/2006/main" xmlns:r="http://schemas.openxmlformats.org/officeDocument/2006/relationships" xmlns:p="http://schemas.openxmlformats.org/presentationml/2006/main">
   <p:cSld>
     <p:spTree>
@@ -12567,13 +13211,13 @@
   <p:clrMapOvr>
     <a:masterClrMapping/>
   </p:clrMapOvr>
-  <mc:AlternateContent xmlns:mc="http://schemas.openxmlformats.org/markup-compatibility/2006">
-    <mc:Choice xmlns:p14="http://schemas.microsoft.com/office/powerpoint/2010/main" Requires="p14">
+  <mc:AlternateContent xmlns:mc="http://schemas.openxmlformats.org/markup-compatibility/2006" xmlns:p14="http://schemas.microsoft.com/office/powerpoint/2010/main">
+    <mc:Choice Requires="p14">
       <p:transition spd="slow" p14:dur="1200">
         <p14:prism/>
       </p:transition>
     </mc:Choice>
-    <mc:Fallback>
+    <mc:Fallback xmlns="">
       <p:transition spd="slow">
         <p:fade/>
       </p:transition>
@@ -12582,7 +13226,7 @@
 </p:sld>
 </file>
 
-<file path=ppt/slides/slide8.xml><?xml version="1.0" encoding="utf-8"?>
+<file path=ppt/slides/slide9.xml><?xml version="1.0" encoding="utf-8"?>
 <p:sld xmlns:a="http://schemas.openxmlformats.org/drawingml/2006/main" xmlns:r="http://schemas.openxmlformats.org/officeDocument/2006/relationships" xmlns:p="http://schemas.openxmlformats.org/presentationml/2006/main">
   <p:cSld>
     <p:spTree>
@@ -12748,382 +13392,13 @@
   <p:clrMapOvr>
     <a:masterClrMapping/>
   </p:clrMapOvr>
-  <mc:AlternateContent xmlns:mc="http://schemas.openxmlformats.org/markup-compatibility/2006">
-    <mc:Choice xmlns:p14="http://schemas.microsoft.com/office/powerpoint/2010/main" Requires="p14">
+  <mc:AlternateContent xmlns:mc="http://schemas.openxmlformats.org/markup-compatibility/2006" xmlns:p14="http://schemas.microsoft.com/office/powerpoint/2010/main">
+    <mc:Choice Requires="p14">
       <p:transition spd="slow" p14:dur="1200">
         <p14:prism/>
       </p:transition>
     </mc:Choice>
-    <mc:Fallback>
-      <p:transition spd="slow">
-        <p:fade/>
-      </p:transition>
-    </mc:Fallback>
-  </mc:AlternateContent>
-</p:sld>
-</file>
-
-<file path=ppt/slides/slide9.xml><?xml version="1.0" encoding="utf-8"?>
-<p:sld xmlns:a="http://schemas.openxmlformats.org/drawingml/2006/main" xmlns:r="http://schemas.openxmlformats.org/officeDocument/2006/relationships" xmlns:p="http://schemas.openxmlformats.org/presentationml/2006/main">
-  <p:cSld>
-    <p:spTree>
-      <p:nvGrpSpPr>
-        <p:cNvPr id="1" name=""/>
-        <p:cNvGrpSpPr/>
-        <p:nvPr/>
-      </p:nvGrpSpPr>
-      <p:grpSpPr>
-        <a:xfrm>
-          <a:off x="0" y="0"/>
-          <a:ext cx="0" cy="0"/>
-          <a:chOff x="0" y="0"/>
-          <a:chExt cx="0" cy="0"/>
-        </a:xfrm>
-      </p:grpSpPr>
-      <p:sp>
-        <p:nvSpPr>
-          <p:cNvPr id="2" name="Title 1">
-            <a:extLst>
-              <a:ext uri="{FF2B5EF4-FFF2-40B4-BE49-F238E27FC236}">
-                <a16:creationId xmlns:a16="http://schemas.microsoft.com/office/drawing/2014/main" id="{5CDD1391-07DC-431B-B81E-A3E454174DE7}"/>
-              </a:ext>
-            </a:extLst>
-          </p:cNvPr>
-          <p:cNvSpPr>
-            <a:spLocks noGrp="1"/>
-          </p:cNvSpPr>
-          <p:nvPr>
-            <p:ph type="title"/>
-          </p:nvPr>
-        </p:nvSpPr>
-        <p:spPr>
-          <a:xfrm>
-            <a:off x="5096823" y="1211386"/>
-            <a:ext cx="4361391" cy="510120"/>
-          </a:xfrm>
-        </p:spPr>
-        <p:txBody>
-          <a:bodyPr>
-            <a:noAutofit/>
-          </a:bodyPr>
-          <a:lstStyle/>
-          <a:p>
-            <a:r>
-              <a:rPr lang="en-US" sz="2800" b="1" dirty="0">
-                <a:solidFill>
-                  <a:schemeClr val="accent2">
-                    <a:lumMod val="75000"/>
-                  </a:schemeClr>
-                </a:solidFill>
-                <a:latin typeface="Arial" panose="020B0604020202020204" pitchFamily="34" charset="0"/>
-                <a:cs typeface="Arial" panose="020B0604020202020204" pitchFamily="34" charset="0"/>
-              </a:rPr>
-              <a:t>GRAPHIC DESIGN</a:t>
-            </a:r>
-            <a:endParaRPr lang="en-IN" sz="2800" b="1" dirty="0">
-              <a:solidFill>
-                <a:schemeClr val="accent2">
-                  <a:lumMod val="75000"/>
-                </a:schemeClr>
-              </a:solidFill>
-              <a:latin typeface="Arial" panose="020B0604020202020204" pitchFamily="34" charset="0"/>
-              <a:cs typeface="Arial" panose="020B0604020202020204" pitchFamily="34" charset="0"/>
-            </a:endParaRPr>
-          </a:p>
-        </p:txBody>
-      </p:sp>
-      <p:sp>
-        <p:nvSpPr>
-          <p:cNvPr id="4" name="Text Placeholder 3">
-            <a:extLst>
-              <a:ext uri="{FF2B5EF4-FFF2-40B4-BE49-F238E27FC236}">
-                <a16:creationId xmlns:a16="http://schemas.microsoft.com/office/drawing/2014/main" id="{316A7AF4-13DE-40BB-9D7D-7BF15D649660}"/>
-              </a:ext>
-            </a:extLst>
-          </p:cNvPr>
-          <p:cNvSpPr>
-            <a:spLocks noGrp="1"/>
-          </p:cNvSpPr>
-          <p:nvPr>
-            <p:ph type="body" sz="half" idx="2"/>
-          </p:nvPr>
-        </p:nvSpPr>
-        <p:spPr>
-          <a:xfrm>
-            <a:off x="5096823" y="1905000"/>
-            <a:ext cx="4847277" cy="1390650"/>
-          </a:xfrm>
-        </p:spPr>
-        <p:txBody>
-          <a:bodyPr>
-            <a:noAutofit/>
-          </a:bodyPr>
-          <a:lstStyle/>
-          <a:p>
-            <a:r>
-              <a:rPr lang="en-US" sz="2000" b="1" i="0" dirty="0">
-                <a:solidFill>
-                  <a:schemeClr val="tx1"/>
-                </a:solidFill>
-                <a:effectLst/>
-                <a:latin typeface="Arial" panose="020B0604020202020204" pitchFamily="34" charset="0"/>
-                <a:cs typeface="Arial" panose="020B0604020202020204" pitchFamily="34" charset="0"/>
-              </a:rPr>
-              <a:t>Graphic design</a:t>
-            </a:r>
-            <a:r>
-              <a:rPr lang="en-US" sz="2000" b="0" i="0" dirty="0">
-                <a:solidFill>
-                  <a:schemeClr val="tx1"/>
-                </a:solidFill>
-                <a:effectLst/>
-                <a:latin typeface="Arial" panose="020B0604020202020204" pitchFamily="34" charset="0"/>
-                <a:cs typeface="Arial" panose="020B0604020202020204" pitchFamily="34" charset="0"/>
-              </a:rPr>
-              <a:t> is the process of visual communication through the use of </a:t>
-            </a:r>
-            <a:r>
-              <a:rPr lang="en-US" sz="2000" b="0" i="0" u="none" strike="noStrike" dirty="0">
-                <a:solidFill>
-                  <a:schemeClr val="tx1"/>
-                </a:solidFill>
-                <a:effectLst/>
-                <a:latin typeface="Arial" panose="020B0604020202020204" pitchFamily="34" charset="0"/>
-                <a:cs typeface="Arial" panose="020B0604020202020204" pitchFamily="34" charset="0"/>
-              </a:rPr>
-              <a:t>typography</a:t>
-            </a:r>
-            <a:r>
-              <a:rPr lang="en-US" sz="2000" b="0" i="0" dirty="0">
-                <a:solidFill>
-                  <a:schemeClr val="tx1"/>
-                </a:solidFill>
-                <a:effectLst/>
-                <a:latin typeface="Arial" panose="020B0604020202020204" pitchFamily="34" charset="0"/>
-                <a:cs typeface="Arial" panose="020B0604020202020204" pitchFamily="34" charset="0"/>
-              </a:rPr>
-              <a:t>, </a:t>
-            </a:r>
-            <a:r>
-              <a:rPr lang="en-US" sz="2000" b="0" i="0" u="none" strike="noStrike" dirty="0">
-                <a:solidFill>
-                  <a:schemeClr val="tx1"/>
-                </a:solidFill>
-                <a:effectLst/>
-                <a:latin typeface="Arial" panose="020B0604020202020204" pitchFamily="34" charset="0"/>
-                <a:cs typeface="Arial" panose="020B0604020202020204" pitchFamily="34" charset="0"/>
-              </a:rPr>
-              <a:t>photography</a:t>
-            </a:r>
-            <a:r>
-              <a:rPr lang="en-US" sz="2000" b="0" i="0" dirty="0">
-                <a:solidFill>
-                  <a:schemeClr val="tx1"/>
-                </a:solidFill>
-                <a:effectLst/>
-                <a:latin typeface="Arial" panose="020B0604020202020204" pitchFamily="34" charset="0"/>
-                <a:cs typeface="Arial" panose="020B0604020202020204" pitchFamily="34" charset="0"/>
-              </a:rPr>
-              <a:t>, </a:t>
-            </a:r>
-            <a:r>
-              <a:rPr lang="en-US" sz="2000" b="0" i="0" u="none" strike="noStrike" dirty="0">
-                <a:solidFill>
-                  <a:schemeClr val="tx1"/>
-                </a:solidFill>
-                <a:effectLst/>
-                <a:latin typeface="Arial" panose="020B0604020202020204" pitchFamily="34" charset="0"/>
-                <a:cs typeface="Arial" panose="020B0604020202020204" pitchFamily="34" charset="0"/>
-              </a:rPr>
-              <a:t>iconography</a:t>
-            </a:r>
-            <a:r>
-              <a:rPr lang="en-US" sz="2000" b="0" i="0" dirty="0">
-                <a:solidFill>
-                  <a:schemeClr val="tx1"/>
-                </a:solidFill>
-                <a:effectLst/>
-                <a:latin typeface="Arial" panose="020B0604020202020204" pitchFamily="34" charset="0"/>
-                <a:cs typeface="Arial" panose="020B0604020202020204" pitchFamily="34" charset="0"/>
-              </a:rPr>
-              <a:t> and </a:t>
-            </a:r>
-            <a:r>
-              <a:rPr lang="en-US" sz="2000" b="0" i="0" u="none" strike="noStrike" dirty="0">
-                <a:solidFill>
-                  <a:schemeClr val="tx1"/>
-                </a:solidFill>
-                <a:effectLst/>
-                <a:latin typeface="Arial" panose="020B0604020202020204" pitchFamily="34" charset="0"/>
-                <a:cs typeface="Arial" panose="020B0604020202020204" pitchFamily="34" charset="0"/>
-              </a:rPr>
-              <a:t>illustration.</a:t>
-            </a:r>
-            <a:endParaRPr lang="en-IN" sz="2000" dirty="0">
-              <a:solidFill>
-                <a:schemeClr val="tx1"/>
-              </a:solidFill>
-              <a:latin typeface="Arial" panose="020B0604020202020204" pitchFamily="34" charset="0"/>
-              <a:cs typeface="Arial" panose="020B0604020202020204" pitchFamily="34" charset="0"/>
-            </a:endParaRPr>
-          </a:p>
-        </p:txBody>
-      </p:sp>
-      <p:pic>
-        <p:nvPicPr>
-          <p:cNvPr id="7" name="Content Placeholder 6">
-            <a:extLst>
-              <a:ext uri="{FF2B5EF4-FFF2-40B4-BE49-F238E27FC236}">
-                <a16:creationId xmlns:a16="http://schemas.microsoft.com/office/drawing/2014/main" id="{AB43B994-48DF-4CAE-A3C1-A4EFA3E04F3A}"/>
-              </a:ext>
-            </a:extLst>
-          </p:cNvPr>
-          <p:cNvPicPr>
-            <a:picLocks noGrp="1" noChangeAspect="1"/>
-          </p:cNvPicPr>
-          <p:nvPr>
-            <p:ph idx="1"/>
-          </p:nvPr>
-        </p:nvPicPr>
-        <p:blipFill>
-          <a:blip r:embed="rId2">
-            <a:extLst>
-              <a:ext uri="{28A0092B-C50C-407E-A947-70E740481C1C}">
-                <a14:useLocalDpi xmlns:a14="http://schemas.microsoft.com/office/drawing/2010/main" val="0"/>
-              </a:ext>
-            </a:extLst>
-          </a:blip>
-          <a:srcRect/>
-          <a:stretch/>
-        </p:blipFill>
-        <p:spPr>
-          <a:xfrm>
-            <a:off x="218966" y="1114259"/>
-            <a:ext cx="4724620" cy="3781591"/>
-          </a:xfrm>
-          <a:prstGeom prst="rect">
-            <a:avLst/>
-          </a:prstGeom>
-          <a:ln>
-            <a:noFill/>
-          </a:ln>
-          <a:effectLst>
-            <a:softEdge rad="112500"/>
-          </a:effectLst>
-        </p:spPr>
-      </p:pic>
-      <p:sp>
-        <p:nvSpPr>
-          <p:cNvPr id="3" name="TextBox 2">
-            <a:extLst>
-              <a:ext uri="{FF2B5EF4-FFF2-40B4-BE49-F238E27FC236}">
-                <a16:creationId xmlns:a16="http://schemas.microsoft.com/office/drawing/2014/main" id="{647B3340-D20C-47C5-9496-BA43A4EC1784}"/>
-              </a:ext>
-            </a:extLst>
-          </p:cNvPr>
-          <p:cNvSpPr txBox="1"/>
-          <p:nvPr/>
-        </p:nvSpPr>
-        <p:spPr>
-          <a:xfrm>
-            <a:off x="5096823" y="3295650"/>
-            <a:ext cx="4563644" cy="1908215"/>
-          </a:xfrm>
-          <a:prstGeom prst="rect">
-            <a:avLst/>
-          </a:prstGeom>
-          <a:noFill/>
-        </p:spPr>
-        <p:txBody>
-          <a:bodyPr wrap="square" rtlCol="0">
-            <a:spAutoFit/>
-          </a:bodyPr>
-          <a:lstStyle/>
-          <a:p>
-            <a:r>
-              <a:rPr lang="en-US" sz="2000" dirty="0">
-                <a:latin typeface="Arial" panose="020B0604020202020204" pitchFamily="34" charset="0"/>
-                <a:cs typeface="Arial" panose="020B0604020202020204" pitchFamily="34" charset="0"/>
-              </a:rPr>
-              <a:t>We offer these graphic design services such as,</a:t>
-            </a:r>
-          </a:p>
-          <a:p>
-            <a:pPr marL="285750" indent="-285750">
-              <a:buFont typeface="Arial" panose="020B0604020202020204" pitchFamily="34" charset="0"/>
-              <a:buChar char="•"/>
-            </a:pPr>
-            <a:r>
-              <a:rPr lang="en-US" sz="2000" dirty="0">
-                <a:solidFill>
-                  <a:schemeClr val="accent1">
-                    <a:lumMod val="75000"/>
-                  </a:schemeClr>
-                </a:solidFill>
-                <a:latin typeface="Arial" panose="020B0604020202020204" pitchFamily="34" charset="0"/>
-                <a:cs typeface="Arial" panose="020B0604020202020204" pitchFamily="34" charset="0"/>
-              </a:rPr>
-              <a:t>Logo Design</a:t>
-            </a:r>
-          </a:p>
-          <a:p>
-            <a:pPr marL="285750" indent="-285750">
-              <a:buFont typeface="Arial" panose="020B0604020202020204" pitchFamily="34" charset="0"/>
-              <a:buChar char="•"/>
-            </a:pPr>
-            <a:r>
-              <a:rPr lang="en-US" sz="2000" dirty="0">
-                <a:solidFill>
-                  <a:schemeClr val="accent1">
-                    <a:lumMod val="75000"/>
-                  </a:schemeClr>
-                </a:solidFill>
-                <a:latin typeface="Arial" panose="020B0604020202020204" pitchFamily="34" charset="0"/>
-                <a:cs typeface="Arial" panose="020B0604020202020204" pitchFamily="34" charset="0"/>
-              </a:rPr>
-              <a:t>UI Design</a:t>
-            </a:r>
-          </a:p>
-          <a:p>
-            <a:pPr marL="285750" indent="-285750">
-              <a:buFont typeface="Arial" panose="020B0604020202020204" pitchFamily="34" charset="0"/>
-              <a:buChar char="•"/>
-            </a:pPr>
-            <a:r>
-              <a:rPr lang="en-US" sz="2000" dirty="0">
-                <a:solidFill>
-                  <a:schemeClr val="accent1">
-                    <a:lumMod val="75000"/>
-                  </a:schemeClr>
-                </a:solidFill>
-                <a:latin typeface="Arial" panose="020B0604020202020204" pitchFamily="34" charset="0"/>
-                <a:cs typeface="Arial" panose="020B0604020202020204" pitchFamily="34" charset="0"/>
-              </a:rPr>
-              <a:t>Publication Graphic Design</a:t>
-            </a:r>
-          </a:p>
-          <a:p>
-            <a:endParaRPr lang="en-IN" dirty="0"/>
-          </a:p>
-        </p:txBody>
-      </p:sp>
-    </p:spTree>
-    <p:extLst>
-      <p:ext uri="{BB962C8B-B14F-4D97-AF65-F5344CB8AC3E}">
-        <p14:creationId xmlns:p14="http://schemas.microsoft.com/office/powerpoint/2010/main" val="3136277155"/>
-      </p:ext>
-    </p:extLst>
-  </p:cSld>
-  <p:clrMapOvr>
-    <a:masterClrMapping/>
-  </p:clrMapOvr>
-  <mc:AlternateContent xmlns:mc="http://schemas.openxmlformats.org/markup-compatibility/2006">
-    <mc:Choice xmlns:p14="http://schemas.microsoft.com/office/powerpoint/2010/main" Requires="p14">
-      <p:transition spd="slow" p14:dur="1200">
-        <p14:prism/>
-      </p:transition>
-    </mc:Choice>
-    <mc:Fallback>
+    <mc:Fallback xmlns="">
       <p:transition spd="slow">
         <p:fade/>
       </p:transition>

</xml_diff>